<commit_message>
[Fix] + changed to - (before f)
</commit_message>
<xml_diff>
--- a/Seminar 08 - week 10/eh_presentaiton.pptx
+++ b/Seminar 08 - week 10/eh_presentaiton.pptx
@@ -18203,7 +18203,7 @@
                       <a:rPr lang="en-US" b="0" i="1" smtClean="0">
                         <a:latin typeface="Cambria Math" panose="02040503050406030204" pitchFamily="18" charset="0"/>
                       </a:rPr>
-                      <m:t>+</m:t>
+                      <m:t>−</m:t>
                     </m:r>
                     <m:r>
                       <a:rPr lang="en-US" b="0" i="1" smtClean="0">
@@ -18612,7 +18612,7 @@
                       <a:rPr lang="en-US" b="0" i="1" smtClean="0">
                         <a:latin typeface="Cambria Math" panose="02040503050406030204" pitchFamily="18" charset="0"/>
                       </a:rPr>
-                      <m:t>+</m:t>
+                      <m:t>−</m:t>
                     </m:r>
                     <m:f>
                       <m:fPr>
@@ -18871,7 +18871,7 @@
                       <a:rPr lang="en-US" b="0" i="1" smtClean="0">
                         <a:latin typeface="Cambria Math" panose="02040503050406030204" pitchFamily="18" charset="0"/>
                       </a:rPr>
-                      <m:t>+</m:t>
+                      <m:t>−</m:t>
                     </m:r>
                     <m:f>
                       <m:fPr>
@@ -19257,7 +19257,7 @@
                       <a:rPr lang="en-US" b="0" i="1" smtClean="0">
                         <a:latin typeface="Cambria Math" panose="02040503050406030204" pitchFamily="18" charset="0"/>
                       </a:rPr>
-                      <m:t>+</m:t>
+                      <m:t>−</m:t>
                     </m:r>
                     <m:f>
                       <m:fPr>
@@ -19603,7 +19603,7 @@
                           <a:rPr lang="en-US" b="0" i="1" smtClean="0">
                             <a:latin typeface="Cambria Math" panose="02040503050406030204" pitchFamily="18" charset="0"/>
                           </a:rPr>
-                          <m:t>+</m:t>
+                          <m:t>−</m:t>
                         </m:r>
                         <m:f>
                           <m:fPr>
@@ -37147,6 +37147,21 @@
 </file>
 
 <file path=customXml/item1.xml><?xml version="1.0" encoding="utf-8"?>
+<p:properties xmlns:p="http://schemas.microsoft.com/office/2006/metadata/properties" xmlns:xsi="http://www.w3.org/2001/XMLSchema-instance" xmlns:pc="http://schemas.microsoft.com/office/infopath/2007/PartnerControls">
+  <documentManagement/>
+</p:properties>
+</file>
+
+<file path=customXml/item2.xml><?xml version="1.0" encoding="utf-8"?>
+<?mso-contentType ?>
+<FormTemplates xmlns="http://schemas.microsoft.com/sharepoint/v3/contenttype/forms">
+  <Display>DocumentLibraryForm</Display>
+  <Edit>DocumentLibraryForm</Edit>
+  <New>DocumentLibraryForm</New>
+</FormTemplates>
+</file>
+
+<file path=customXml/item3.xml><?xml version="1.0" encoding="utf-8"?>
 <ct:contentTypeSchema xmlns:ct="http://schemas.microsoft.com/office/2006/metadata/contentType" xmlns:ma="http://schemas.microsoft.com/office/2006/metadata/properties/metaAttributes" ct:_="" ma:_="" ma:contentTypeName="Документ" ma:contentTypeID="0x0101002A9C74E6E830D74E9B0FDDB4017A5417" ma:contentTypeVersion="13" ma:contentTypeDescription="Создание документа." ma:contentTypeScope="" ma:versionID="d4e423622451d608a8a05f4da7a1e1a2">
   <xsd:schema xmlns:xsd="http://www.w3.org/2001/XMLSchema" xmlns:xs="http://www.w3.org/2001/XMLSchema" xmlns:p="http://schemas.microsoft.com/office/2006/metadata/properties" xmlns:ns2="9875bd71-cde8-496c-a136-433f55d5e6d0" xmlns:ns3="e96afe77-3acb-4328-97fc-408e1bde3ecd" targetNamespace="http://schemas.microsoft.com/office/2006/metadata/properties" ma:root="true" ma:fieldsID="4831203c63c08b9f52ea6d3ee0d7a96e" ns2:_="" ns3:_="">
     <xsd:import namespace="9875bd71-cde8-496c-a136-433f55d5e6d0"/>
@@ -37369,22 +37384,32 @@
 </ct:contentTypeSchema>
 </file>
 
-<file path=customXml/item2.xml><?xml version="1.0" encoding="utf-8"?>
-<?mso-contentType ?>
-<FormTemplates xmlns="http://schemas.microsoft.com/sharepoint/v3/contenttype/forms">
-  <Display>DocumentLibraryForm</Display>
-  <Edit>DocumentLibraryForm</Edit>
-  <New>DocumentLibraryForm</New>
-</FormTemplates>
+<file path=customXml/itemProps1.xml><?xml version="1.0" encoding="utf-8"?>
+<ds:datastoreItem xmlns:ds="http://schemas.openxmlformats.org/officeDocument/2006/customXml" ds:itemID="{433DAF31-D8A6-49A0-9A5D-8B2EA5B1C511}">
+  <ds:schemaRefs>
+    <ds:schemaRef ds:uri="http://purl.org/dc/elements/1.1/"/>
+    <ds:schemaRef ds:uri="http://schemas.microsoft.com/office/2006/documentManagement/types"/>
+    <ds:schemaRef ds:uri="http://schemas.microsoft.com/office/infopath/2007/PartnerControls"/>
+    <ds:schemaRef ds:uri="http://purl.org/dc/dcmitype/"/>
+    <ds:schemaRef ds:uri="e96afe77-3acb-4328-97fc-408e1bde3ecd"/>
+    <ds:schemaRef ds:uri="http://schemas.microsoft.com/office/2006/metadata/properties"/>
+    <ds:schemaRef ds:uri="http://purl.org/dc/terms/"/>
+    <ds:schemaRef ds:uri="http://www.w3.org/XML/1998/namespace"/>
+    <ds:schemaRef ds:uri="http://schemas.openxmlformats.org/package/2006/metadata/core-properties"/>
+    <ds:schemaRef ds:uri="9875bd71-cde8-496c-a136-433f55d5e6d0"/>
+  </ds:schemaRefs>
+</ds:datastoreItem>
 </file>
 
-<file path=customXml/item3.xml><?xml version="1.0" encoding="utf-8"?>
-<p:properties xmlns:p="http://schemas.microsoft.com/office/2006/metadata/properties" xmlns:xsi="http://www.w3.org/2001/XMLSchema-instance" xmlns:pc="http://schemas.microsoft.com/office/infopath/2007/PartnerControls">
-  <documentManagement/>
-</p:properties>
+<file path=customXml/itemProps2.xml><?xml version="1.0" encoding="utf-8"?>
+<ds:datastoreItem xmlns:ds="http://schemas.openxmlformats.org/officeDocument/2006/customXml" ds:itemID="{B34386AA-1848-4C75-B336-1053927CB025}">
+  <ds:schemaRefs>
+    <ds:schemaRef ds:uri="http://schemas.microsoft.com/sharepoint/v3/contenttype/forms"/>
+  </ds:schemaRefs>
+</ds:datastoreItem>
 </file>
 
-<file path=customXml/itemProps1.xml><?xml version="1.0" encoding="utf-8"?>
+<file path=customXml/itemProps3.xml><?xml version="1.0" encoding="utf-8"?>
 <ds:datastoreItem xmlns:ds="http://schemas.openxmlformats.org/officeDocument/2006/customXml" ds:itemID="{4D4651DD-DCCC-4759-B2F6-7F520BDCC2B9}">
   <ds:schemaRefs>
     <ds:schemaRef ds:uri="http://schemas.microsoft.com/office/2006/metadata/contentType"/>
@@ -37401,29 +37426,4 @@
     <ds:schemaRef ds:uri="http://schemas.microsoft.com/internal/obd"/>
   </ds:schemaRefs>
 </ds:datastoreItem>
-</file>
-
-<file path=customXml/itemProps2.xml><?xml version="1.0" encoding="utf-8"?>
-<ds:datastoreItem xmlns:ds="http://schemas.openxmlformats.org/officeDocument/2006/customXml" ds:itemID="{B34386AA-1848-4C75-B336-1053927CB025}">
-  <ds:schemaRefs>
-    <ds:schemaRef ds:uri="http://schemas.microsoft.com/sharepoint/v3/contenttype/forms"/>
-  </ds:schemaRefs>
-</ds:datastoreItem>
-</file>
-
-<file path=customXml/itemProps3.xml><?xml version="1.0" encoding="utf-8"?>
-<ds:datastoreItem xmlns:ds="http://schemas.openxmlformats.org/officeDocument/2006/customXml" ds:itemID="{433DAF31-D8A6-49A0-9A5D-8B2EA5B1C511}">
-  <ds:schemaRefs>
-    <ds:schemaRef ds:uri="http://purl.org/dc/elements/1.1/"/>
-    <ds:schemaRef ds:uri="http://schemas.microsoft.com/office/2006/documentManagement/types"/>
-    <ds:schemaRef ds:uri="http://schemas.microsoft.com/office/infopath/2007/PartnerControls"/>
-    <ds:schemaRef ds:uri="http://purl.org/dc/dcmitype/"/>
-    <ds:schemaRef ds:uri="e96afe77-3acb-4328-97fc-408e1bde3ecd"/>
-    <ds:schemaRef ds:uri="http://schemas.microsoft.com/office/2006/metadata/properties"/>
-    <ds:schemaRef ds:uri="http://purl.org/dc/terms/"/>
-    <ds:schemaRef ds:uri="http://www.w3.org/XML/1998/namespace"/>
-    <ds:schemaRef ds:uri="http://schemas.openxmlformats.org/package/2006/metadata/core-properties"/>
-    <ds:schemaRef ds:uri="9875bd71-cde8-496c-a136-433f55d5e6d0"/>
-  </ds:schemaRefs>
-</ds:datastoreItem>
 </file>
</xml_diff>